<commit_message>
first app including tests
</commit_message>
<xml_diff>
--- a/pptx/20200614_presentation.pptx
+++ b/pptx/20200614_presentation.pptx
@@ -5,17 +5,18 @@
     <p:sldMasterId id="2147483648" r:id="rId1"/>
   </p:sldMasterIdLst>
   <p:notesMasterIdLst>
-    <p:notesMasterId r:id="rId5"/>
+    <p:notesMasterId r:id="rId6"/>
   </p:notesMasterIdLst>
   <p:sldIdLst>
     <p:sldId id="315" r:id="rId2"/>
-    <p:sldId id="317" r:id="rId3"/>
-    <p:sldId id="336" r:id="rId4"/>
+    <p:sldId id="337" r:id="rId3"/>
+    <p:sldId id="317" r:id="rId4"/>
+    <p:sldId id="336" r:id="rId5"/>
   </p:sldIdLst>
   <p:sldSz cx="12192000" cy="6858000"/>
   <p:notesSz cx="6858000" cy="9144000"/>
   <p:custDataLst>
-    <p:tags r:id="rId6"/>
+    <p:tags r:id="rId7"/>
   </p:custDataLst>
   <p:defaultTextStyle>
     <a:defPPr>
@@ -202,7 +203,7 @@
           <a:p>
             <a:fld id="{66CF2F4E-8AB7-4C35-ADD5-AB8442724B06}" type="datetimeFigureOut">
               <a:rPr lang="en-US" smtClean="0"/>
-              <a:t>6/15/2020</a:t>
+              <a:t>6/16/2020</a:t>
             </a:fld>
             <a:endParaRPr lang="en-US"/>
           </a:p>
@@ -682,7 +683,7 @@
           <a:p>
             <a:fld id="{3C5A48BF-A942-407A-BDB0-98030DA5BF30}" type="datetime1">
               <a:rPr lang="en-US" smtClean="0"/>
-              <a:t>6/15/2020</a:t>
+              <a:t>6/16/2020</a:t>
             </a:fld>
             <a:endParaRPr lang="en-US"/>
           </a:p>
@@ -850,7 +851,7 @@
           <a:p>
             <a:fld id="{C6B17BEF-22BA-493E-AC33-7C4A34D2DEC9}" type="datetime1">
               <a:rPr lang="en-US" smtClean="0"/>
-              <a:t>6/15/2020</a:t>
+              <a:t>6/16/2020</a:t>
             </a:fld>
             <a:endParaRPr lang="en-US"/>
           </a:p>
@@ -1028,7 +1029,7 @@
           <a:p>
             <a:fld id="{E3E54652-4F53-4DF0-B582-4FE6B243DD80}" type="datetime1">
               <a:rPr lang="en-US" smtClean="0"/>
-              <a:t>6/15/2020</a:t>
+              <a:t>6/16/2020</a:t>
             </a:fld>
             <a:endParaRPr lang="en-US"/>
           </a:p>
@@ -1286,7 +1287,7 @@
           <a:p>
             <a:fld id="{D83F0E1A-0507-4046-99B0-239F1A29DF61}" type="datetime1">
               <a:rPr lang="en-US" smtClean="0"/>
-              <a:t>6/15/2020</a:t>
+              <a:t>6/16/2020</a:t>
             </a:fld>
             <a:endParaRPr lang="en-US"/>
           </a:p>
@@ -1734,7 +1735,7 @@
           <a:p>
             <a:fld id="{C1BF405F-53A1-460E-A59C-D0D8BBB90525}" type="datetime1">
               <a:rPr lang="en-US" smtClean="0"/>
-              <a:t>6/15/2020</a:t>
+              <a:t>6/16/2020</a:t>
             </a:fld>
             <a:endParaRPr lang="en-US"/>
           </a:p>
@@ -1963,7 +1964,7 @@
           <a:p>
             <a:fld id="{2C61C02C-F072-4AEF-BB42-80953B418394}" type="datetime1">
               <a:rPr lang="en-US" smtClean="0"/>
-              <a:t>6/15/2020</a:t>
+              <a:t>6/16/2020</a:t>
             </a:fld>
             <a:endParaRPr lang="en-US"/>
           </a:p>
@@ -2327,7 +2328,7 @@
           <a:p>
             <a:fld id="{2FA08B48-BF54-4C02-8552-AB3432DC213F}" type="datetime1">
               <a:rPr lang="en-US" smtClean="0"/>
-              <a:t>6/15/2020</a:t>
+              <a:t>6/16/2020</a:t>
             </a:fld>
             <a:endParaRPr lang="en-US"/>
           </a:p>
@@ -2444,7 +2445,7 @@
           <a:p>
             <a:fld id="{F1E9FEEB-A132-44FD-AB71-947E465B307C}" type="datetime1">
               <a:rPr lang="en-US" smtClean="0"/>
-              <a:t>6/15/2020</a:t>
+              <a:t>6/16/2020</a:t>
             </a:fld>
             <a:endParaRPr lang="en-US"/>
           </a:p>
@@ -2539,7 +2540,7 @@
           <a:p>
             <a:fld id="{D7B1AB69-9DC0-4C5D-8F47-332D56A52127}" type="datetime1">
               <a:rPr lang="en-US" smtClean="0"/>
-              <a:t>6/15/2020</a:t>
+              <a:t>6/16/2020</a:t>
             </a:fld>
             <a:endParaRPr lang="en-US"/>
           </a:p>
@@ -2814,7 +2815,7 @@
           <a:p>
             <a:fld id="{F5C9B912-63E5-4319-BF4C-B092FB084A35}" type="datetime1">
               <a:rPr lang="en-US" smtClean="0"/>
-              <a:t>6/15/2020</a:t>
+              <a:t>6/16/2020</a:t>
             </a:fld>
             <a:endParaRPr lang="en-US"/>
           </a:p>
@@ -3066,7 +3067,7 @@
           <a:p>
             <a:fld id="{E8EA33DD-09AC-449F-9F6A-05C19B1437DD}" type="datetime1">
               <a:rPr lang="en-US" smtClean="0"/>
-              <a:t>6/15/2020</a:t>
+              <a:t>6/16/2020</a:t>
             </a:fld>
             <a:endParaRPr lang="en-US"/>
           </a:p>
@@ -3277,7 +3278,7 @@
           <a:p>
             <a:fld id="{4B217B24-2B36-49FB-8CF4-521669E0608D}" type="datetime1">
               <a:rPr lang="en-US" smtClean="0"/>
-              <a:t>6/15/2020</a:t>
+              <a:t>6/16/2020</a:t>
             </a:fld>
             <a:endParaRPr lang="en-US"/>
           </a:p>
@@ -3880,6 +3881,697 @@
       </p:grpSpPr>
       <p:sp>
         <p:nvSpPr>
+          <p:cNvPr id="2" name="Title 1">
+            <a:extLst>
+              <a:ext uri="{FF2B5EF4-FFF2-40B4-BE49-F238E27FC236}">
+                <a16:creationId xmlns:a16="http://schemas.microsoft.com/office/drawing/2014/main" id="{7EBE3562-998F-4226-B05E-4BD0EC062D57}"/>
+              </a:ext>
+            </a:extLst>
+          </p:cNvPr>
+          <p:cNvSpPr>
+            <a:spLocks noGrp="1"/>
+          </p:cNvSpPr>
+          <p:nvPr>
+            <p:ph type="title"/>
+          </p:nvPr>
+        </p:nvSpPr>
+        <p:spPr/>
+        <p:txBody>
+          <a:bodyPr/>
+          <a:lstStyle/>
+          <a:p>
+            <a:r>
+              <a:rPr lang="de-CH" dirty="0"/>
+              <a:t>Statistical Evaluations</a:t>
+            </a:r>
+          </a:p>
+        </p:txBody>
+      </p:sp>
+      <p:sp>
+        <p:nvSpPr>
+          <p:cNvPr id="4" name="Slide Number Placeholder 3">
+            <a:extLst>
+              <a:ext uri="{FF2B5EF4-FFF2-40B4-BE49-F238E27FC236}">
+                <a16:creationId xmlns:a16="http://schemas.microsoft.com/office/drawing/2014/main" id="{DE1B6538-D775-432F-9479-A435E20008E2}"/>
+              </a:ext>
+            </a:extLst>
+          </p:cNvPr>
+          <p:cNvSpPr>
+            <a:spLocks noGrp="1"/>
+          </p:cNvSpPr>
+          <p:nvPr>
+            <p:ph type="sldNum" sz="quarter" idx="12"/>
+          </p:nvPr>
+        </p:nvSpPr>
+        <p:spPr/>
+        <p:txBody>
+          <a:bodyPr/>
+          <a:lstStyle/>
+          <a:p>
+            <a:fld id="{71F18206-3CFE-43A4-B2DC-9A718AC19900}" type="slidenum">
+              <a:rPr lang="en-US" smtClean="0"/>
+              <a:pPr/>
+              <a:t>2</a:t>
+            </a:fld>
+            <a:endParaRPr lang="en-US"/>
+          </a:p>
+        </p:txBody>
+      </p:sp>
+      <p:sp>
+        <p:nvSpPr>
+          <p:cNvPr id="5" name="Text Placeholder 4">
+            <a:extLst>
+              <a:ext uri="{FF2B5EF4-FFF2-40B4-BE49-F238E27FC236}">
+                <a16:creationId xmlns:a16="http://schemas.microsoft.com/office/drawing/2014/main" id="{5F2D4DB3-121A-4656-ADA7-27503DBA8159}"/>
+              </a:ext>
+            </a:extLst>
+          </p:cNvPr>
+          <p:cNvSpPr>
+            <a:spLocks noGrp="1"/>
+          </p:cNvSpPr>
+          <p:nvPr>
+            <p:ph type="body" sz="quarter" idx="13"/>
+          </p:nvPr>
+        </p:nvSpPr>
+        <p:spPr>
+          <a:xfrm>
+            <a:off x="833148" y="5240978"/>
+            <a:ext cx="2334414" cy="641350"/>
+          </a:xfrm>
+        </p:spPr>
+        <p:txBody>
+          <a:bodyPr/>
+          <a:lstStyle/>
+          <a:p>
+            <a:pPr algn="ctr"/>
+            <a:r>
+              <a:rPr lang="de-CH" dirty="0"/>
+              <a:t>Summary Table</a:t>
+            </a:r>
+          </a:p>
+        </p:txBody>
+      </p:sp>
+      <p:sp>
+        <p:nvSpPr>
+          <p:cNvPr id="6" name="Text Placeholder 5">
+            <a:extLst>
+              <a:ext uri="{FF2B5EF4-FFF2-40B4-BE49-F238E27FC236}">
+                <a16:creationId xmlns:a16="http://schemas.microsoft.com/office/drawing/2014/main" id="{D1BCE92C-1514-4210-B363-B13D925DC8E3}"/>
+              </a:ext>
+            </a:extLst>
+          </p:cNvPr>
+          <p:cNvSpPr>
+            <a:spLocks noGrp="1"/>
+          </p:cNvSpPr>
+          <p:nvPr>
+            <p:ph type="body" sz="quarter" idx="14"/>
+          </p:nvPr>
+        </p:nvSpPr>
+        <p:spPr/>
+        <p:txBody>
+          <a:bodyPr/>
+          <a:lstStyle/>
+          <a:p>
+            <a:r>
+              <a:rPr lang="de-CH" dirty="0"/>
+              <a:t>Icons </a:t>
+            </a:r>
+            <a:r>
+              <a:rPr lang="de-CH" dirty="0" err="1"/>
+              <a:t>from</a:t>
+            </a:r>
+            <a:r>
+              <a:rPr lang="de-CH" dirty="0"/>
+              <a:t> </a:t>
+            </a:r>
+            <a:r>
+              <a:rPr lang="de-CH" b="1" dirty="0">
+                <a:hlinkClick r:id="rId2"/>
+              </a:rPr>
+              <a:t>Pixel </a:t>
+            </a:r>
+            <a:r>
+              <a:rPr lang="de-CH" b="1" dirty="0" err="1">
+                <a:hlinkClick r:id="rId2"/>
+              </a:rPr>
+              <a:t>perfect</a:t>
+            </a:r>
+            <a:endParaRPr lang="de-CH" b="1" dirty="0"/>
+          </a:p>
+          <a:p>
+            <a:endParaRPr lang="de-CH" dirty="0"/>
+          </a:p>
+        </p:txBody>
+      </p:sp>
+      <p:pic>
+        <p:nvPicPr>
+          <p:cNvPr id="8" name="Picture 7" descr="A close up of a logo&#10;&#10;Description automatically generated">
+            <a:extLst>
+              <a:ext uri="{FF2B5EF4-FFF2-40B4-BE49-F238E27FC236}">
+                <a16:creationId xmlns:a16="http://schemas.microsoft.com/office/drawing/2014/main" id="{0E60F541-2137-42C6-BB08-3E801DAA4353}"/>
+              </a:ext>
+            </a:extLst>
+          </p:cNvPr>
+          <p:cNvPicPr>
+            <a:picLocks noChangeAspect="1"/>
+          </p:cNvPicPr>
+          <p:nvPr/>
+        </p:nvPicPr>
+        <p:blipFill rotWithShape="1">
+          <a:blip r:embed="rId3">
+            <a:extLst>
+              <a:ext uri="{28A0092B-C50C-407E-A947-70E740481C1C}">
+                <a14:useLocalDpi xmlns:a14="http://schemas.microsoft.com/office/drawing/2010/main" val="0"/>
+              </a:ext>
+            </a:extLst>
+          </a:blip>
+          <a:srcRect l="8430"/>
+          <a:stretch/>
+        </p:blipFill>
+        <p:spPr>
+          <a:xfrm>
+            <a:off x="833148" y="2247937"/>
+            <a:ext cx="2516284" cy="2747947"/>
+          </a:xfrm>
+          <a:prstGeom prst="rect">
+            <a:avLst/>
+          </a:prstGeom>
+        </p:spPr>
+      </p:pic>
+      <p:pic>
+        <p:nvPicPr>
+          <p:cNvPr id="10" name="Picture 9" descr="A close up of a logo&#10;&#10;Description automatically generated">
+            <a:extLst>
+              <a:ext uri="{FF2B5EF4-FFF2-40B4-BE49-F238E27FC236}">
+                <a16:creationId xmlns:a16="http://schemas.microsoft.com/office/drawing/2014/main" id="{6E6EA891-E898-4E90-AC1A-213F473F3363}"/>
+              </a:ext>
+            </a:extLst>
+          </p:cNvPr>
+          <p:cNvPicPr>
+            <a:picLocks noChangeAspect="1"/>
+          </p:cNvPicPr>
+          <p:nvPr/>
+        </p:nvPicPr>
+        <p:blipFill>
+          <a:blip r:embed="rId4">
+            <a:extLst>
+              <a:ext uri="{28A0092B-C50C-407E-A947-70E740481C1C}">
+                <a14:useLocalDpi xmlns:a14="http://schemas.microsoft.com/office/drawing/2010/main" val="0"/>
+              </a:ext>
+            </a:extLst>
+          </a:blip>
+          <a:stretch>
+            <a:fillRect/>
+          </a:stretch>
+        </p:blipFill>
+        <p:spPr>
+          <a:xfrm>
+            <a:off x="4603516" y="2247937"/>
+            <a:ext cx="2747947" cy="2747947"/>
+          </a:xfrm>
+          <a:prstGeom prst="rect">
+            <a:avLst/>
+          </a:prstGeom>
+        </p:spPr>
+      </p:pic>
+      <p:pic>
+        <p:nvPicPr>
+          <p:cNvPr id="12" name="Picture 11" descr="A close up of a logo&#10;&#10;Description automatically generated">
+            <a:extLst>
+              <a:ext uri="{FF2B5EF4-FFF2-40B4-BE49-F238E27FC236}">
+                <a16:creationId xmlns:a16="http://schemas.microsoft.com/office/drawing/2014/main" id="{CE21B3F9-4463-4E94-AC32-821E5BB87FFC}"/>
+              </a:ext>
+            </a:extLst>
+          </p:cNvPr>
+          <p:cNvPicPr>
+            <a:picLocks noChangeAspect="1"/>
+          </p:cNvPicPr>
+          <p:nvPr/>
+        </p:nvPicPr>
+        <p:blipFill>
+          <a:blip r:embed="rId5">
+            <a:extLst>
+              <a:ext uri="{28A0092B-C50C-407E-A947-70E740481C1C}">
+                <a14:useLocalDpi xmlns:a14="http://schemas.microsoft.com/office/drawing/2010/main" val="0"/>
+              </a:ext>
+            </a:extLst>
+          </a:blip>
+          <a:stretch>
+            <a:fillRect/>
+          </a:stretch>
+        </p:blipFill>
+        <p:spPr>
+          <a:xfrm>
+            <a:off x="8605548" y="2247937"/>
+            <a:ext cx="2743200" cy="2743200"/>
+          </a:xfrm>
+          <a:prstGeom prst="rect">
+            <a:avLst/>
+          </a:prstGeom>
+        </p:spPr>
+      </p:pic>
+      <p:sp>
+        <p:nvSpPr>
+          <p:cNvPr id="13" name="Text Placeholder 4">
+            <a:extLst>
+              <a:ext uri="{FF2B5EF4-FFF2-40B4-BE49-F238E27FC236}">
+                <a16:creationId xmlns:a16="http://schemas.microsoft.com/office/drawing/2014/main" id="{672A6315-6CE6-4570-AB51-3D93A54FC363}"/>
+              </a:ext>
+            </a:extLst>
+          </p:cNvPr>
+          <p:cNvSpPr txBox="1">
+            <a:spLocks/>
+          </p:cNvSpPr>
+          <p:nvPr/>
+        </p:nvSpPr>
+        <p:spPr>
+          <a:xfrm>
+            <a:off x="4810282" y="5228606"/>
+            <a:ext cx="2334414" cy="641350"/>
+          </a:xfrm>
+          <a:prstGeom prst="rect">
+            <a:avLst/>
+          </a:prstGeom>
+        </p:spPr>
+        <p:txBody>
+          <a:bodyPr vert="horz" lIns="91440" tIns="144000" rIns="91440" bIns="45720" rtlCol="0">
+            <a:normAutofit/>
+          </a:bodyPr>
+          <a:lstStyle>
+            <a:lvl1pPr marL="0" indent="0" algn="l" defTabSz="914400" rtl="0" eaLnBrk="1" latinLnBrk="0" hangingPunct="1">
+              <a:lnSpc>
+                <a:spcPct val="90000"/>
+              </a:lnSpc>
+              <a:spcBef>
+                <a:spcPts val="1000"/>
+              </a:spcBef>
+              <a:buFont typeface="Arial" panose="020B0604020202020204" pitchFamily="34" charset="0"/>
+              <a:buNone/>
+              <a:defRPr sz="2400" kern="1200">
+                <a:solidFill>
+                  <a:schemeClr val="tx1">
+                    <a:lumMod val="65000"/>
+                    <a:lumOff val="35000"/>
+                  </a:schemeClr>
+                </a:solidFill>
+                <a:latin typeface="Roboto Light" panose="02000000000000000000" pitchFamily="2" charset="0"/>
+                <a:ea typeface="Roboto Light" panose="02000000000000000000" pitchFamily="2" charset="0"/>
+                <a:cs typeface="+mn-cs"/>
+              </a:defRPr>
+            </a:lvl1pPr>
+            <a:lvl2pPr marL="457200" indent="0" algn="l" defTabSz="914400" rtl="0" eaLnBrk="1" latinLnBrk="0" hangingPunct="1">
+              <a:lnSpc>
+                <a:spcPct val="90000"/>
+              </a:lnSpc>
+              <a:spcBef>
+                <a:spcPts val="500"/>
+              </a:spcBef>
+              <a:buFont typeface="Arial" panose="020B0604020202020204" pitchFamily="34" charset="0"/>
+              <a:buNone/>
+              <a:defRPr sz="2400" kern="1200">
+                <a:solidFill>
+                  <a:srgbClr val="949494"/>
+                </a:solidFill>
+                <a:latin typeface="Roboto Light" panose="02000000000000000000" pitchFamily="2" charset="0"/>
+                <a:ea typeface="Roboto Light" panose="02000000000000000000" pitchFamily="2" charset="0"/>
+                <a:cs typeface="+mn-cs"/>
+              </a:defRPr>
+            </a:lvl2pPr>
+            <a:lvl3pPr marL="914400" indent="0" algn="l" defTabSz="914400" rtl="0" eaLnBrk="1" latinLnBrk="0" hangingPunct="1">
+              <a:lnSpc>
+                <a:spcPct val="90000"/>
+              </a:lnSpc>
+              <a:spcBef>
+                <a:spcPts val="500"/>
+              </a:spcBef>
+              <a:buFont typeface="Arial" panose="020B0604020202020204" pitchFamily="34" charset="0"/>
+              <a:buNone/>
+              <a:defRPr sz="2000" kern="1200">
+                <a:solidFill>
+                  <a:srgbClr val="949494"/>
+                </a:solidFill>
+                <a:latin typeface="Roboto Light" panose="02000000000000000000" pitchFamily="2" charset="0"/>
+                <a:ea typeface="Roboto Light" panose="02000000000000000000" pitchFamily="2" charset="0"/>
+                <a:cs typeface="+mn-cs"/>
+              </a:defRPr>
+            </a:lvl3pPr>
+            <a:lvl4pPr marL="1371600" indent="0" algn="l" defTabSz="914400" rtl="0" eaLnBrk="1" latinLnBrk="0" hangingPunct="1">
+              <a:lnSpc>
+                <a:spcPct val="90000"/>
+              </a:lnSpc>
+              <a:spcBef>
+                <a:spcPts val="500"/>
+              </a:spcBef>
+              <a:buFont typeface="Arial" panose="020B0604020202020204" pitchFamily="34" charset="0"/>
+              <a:buNone/>
+              <a:defRPr sz="1800" kern="1200">
+                <a:solidFill>
+                  <a:srgbClr val="949494"/>
+                </a:solidFill>
+                <a:latin typeface="Roboto Light" panose="02000000000000000000" pitchFamily="2" charset="0"/>
+                <a:ea typeface="Roboto Light" panose="02000000000000000000" pitchFamily="2" charset="0"/>
+                <a:cs typeface="+mn-cs"/>
+              </a:defRPr>
+            </a:lvl4pPr>
+            <a:lvl5pPr marL="1828800" indent="0" algn="l" defTabSz="914400" rtl="0" eaLnBrk="1" latinLnBrk="0" hangingPunct="1">
+              <a:lnSpc>
+                <a:spcPct val="90000"/>
+              </a:lnSpc>
+              <a:spcBef>
+                <a:spcPts val="500"/>
+              </a:spcBef>
+              <a:buFont typeface="Arial" panose="020B0604020202020204" pitchFamily="34" charset="0"/>
+              <a:buNone/>
+              <a:defRPr sz="1800" kern="1200">
+                <a:solidFill>
+                  <a:srgbClr val="949494"/>
+                </a:solidFill>
+                <a:latin typeface="Roboto Light" panose="02000000000000000000" pitchFamily="2" charset="0"/>
+                <a:ea typeface="Roboto Light" panose="02000000000000000000" pitchFamily="2" charset="0"/>
+                <a:cs typeface="+mn-cs"/>
+              </a:defRPr>
+            </a:lvl5pPr>
+            <a:lvl6pPr marL="2514600" indent="-228600" algn="l" defTabSz="914400" rtl="0" eaLnBrk="1" latinLnBrk="0" hangingPunct="1">
+              <a:lnSpc>
+                <a:spcPct val="90000"/>
+              </a:lnSpc>
+              <a:spcBef>
+                <a:spcPts val="500"/>
+              </a:spcBef>
+              <a:buFont typeface="Arial" panose="020B0604020202020204" pitchFamily="34" charset="0"/>
+              <a:buChar char="•"/>
+              <a:defRPr sz="1800" kern="1200">
+                <a:solidFill>
+                  <a:schemeClr val="tx1"/>
+                </a:solidFill>
+                <a:latin typeface="+mn-lt"/>
+                <a:ea typeface="+mn-ea"/>
+                <a:cs typeface="+mn-cs"/>
+              </a:defRPr>
+            </a:lvl6pPr>
+            <a:lvl7pPr marL="2971800" indent="-228600" algn="l" defTabSz="914400" rtl="0" eaLnBrk="1" latinLnBrk="0" hangingPunct="1">
+              <a:lnSpc>
+                <a:spcPct val="90000"/>
+              </a:lnSpc>
+              <a:spcBef>
+                <a:spcPts val="500"/>
+              </a:spcBef>
+              <a:buFont typeface="Arial" panose="020B0604020202020204" pitchFamily="34" charset="0"/>
+              <a:buChar char="•"/>
+              <a:defRPr sz="1800" kern="1200">
+                <a:solidFill>
+                  <a:schemeClr val="tx1"/>
+                </a:solidFill>
+                <a:latin typeface="+mn-lt"/>
+                <a:ea typeface="+mn-ea"/>
+                <a:cs typeface="+mn-cs"/>
+              </a:defRPr>
+            </a:lvl7pPr>
+            <a:lvl8pPr marL="3429000" indent="-228600" algn="l" defTabSz="914400" rtl="0" eaLnBrk="1" latinLnBrk="0" hangingPunct="1">
+              <a:lnSpc>
+                <a:spcPct val="90000"/>
+              </a:lnSpc>
+              <a:spcBef>
+                <a:spcPts val="500"/>
+              </a:spcBef>
+              <a:buFont typeface="Arial" panose="020B0604020202020204" pitchFamily="34" charset="0"/>
+              <a:buChar char="•"/>
+              <a:defRPr sz="1800" kern="1200">
+                <a:solidFill>
+                  <a:schemeClr val="tx1"/>
+                </a:solidFill>
+                <a:latin typeface="+mn-lt"/>
+                <a:ea typeface="+mn-ea"/>
+                <a:cs typeface="+mn-cs"/>
+              </a:defRPr>
+            </a:lvl8pPr>
+            <a:lvl9pPr marL="3886200" indent="-228600" algn="l" defTabSz="914400" rtl="0" eaLnBrk="1" latinLnBrk="0" hangingPunct="1">
+              <a:lnSpc>
+                <a:spcPct val="90000"/>
+              </a:lnSpc>
+              <a:spcBef>
+                <a:spcPts val="500"/>
+              </a:spcBef>
+              <a:buFont typeface="Arial" panose="020B0604020202020204" pitchFamily="34" charset="0"/>
+              <a:buChar char="•"/>
+              <a:defRPr sz="1800" kern="1200">
+                <a:solidFill>
+                  <a:schemeClr val="tx1"/>
+                </a:solidFill>
+                <a:latin typeface="+mn-lt"/>
+                <a:ea typeface="+mn-ea"/>
+                <a:cs typeface="+mn-cs"/>
+              </a:defRPr>
+            </a:lvl9pPr>
+          </a:lstStyle>
+          <a:p>
+            <a:pPr algn="ctr"/>
+            <a:r>
+              <a:rPr lang="de-CH" dirty="0"/>
+              <a:t>Distribution Plot</a:t>
+            </a:r>
+          </a:p>
+        </p:txBody>
+      </p:sp>
+      <p:sp>
+        <p:nvSpPr>
+          <p:cNvPr id="14" name="Text Placeholder 4">
+            <a:extLst>
+              <a:ext uri="{FF2B5EF4-FFF2-40B4-BE49-F238E27FC236}">
+                <a16:creationId xmlns:a16="http://schemas.microsoft.com/office/drawing/2014/main" id="{BF00989F-6375-456A-B2EB-59913DD9CE65}"/>
+              </a:ext>
+            </a:extLst>
+          </p:cNvPr>
+          <p:cNvSpPr txBox="1">
+            <a:spLocks/>
+          </p:cNvSpPr>
+          <p:nvPr/>
+        </p:nvSpPr>
+        <p:spPr>
+          <a:xfrm>
+            <a:off x="8809941" y="5223859"/>
+            <a:ext cx="2334414" cy="641350"/>
+          </a:xfrm>
+          <a:prstGeom prst="rect">
+            <a:avLst/>
+          </a:prstGeom>
+        </p:spPr>
+        <p:txBody>
+          <a:bodyPr vert="horz" lIns="91440" tIns="144000" rIns="91440" bIns="45720" rtlCol="0">
+            <a:normAutofit/>
+          </a:bodyPr>
+          <a:lstStyle>
+            <a:lvl1pPr marL="0" indent="0" algn="l" defTabSz="914400" rtl="0" eaLnBrk="1" latinLnBrk="0" hangingPunct="1">
+              <a:lnSpc>
+                <a:spcPct val="90000"/>
+              </a:lnSpc>
+              <a:spcBef>
+                <a:spcPts val="1000"/>
+              </a:spcBef>
+              <a:buFont typeface="Arial" panose="020B0604020202020204" pitchFamily="34" charset="0"/>
+              <a:buNone/>
+              <a:defRPr sz="2400" kern="1200">
+                <a:solidFill>
+                  <a:schemeClr val="tx1">
+                    <a:lumMod val="65000"/>
+                    <a:lumOff val="35000"/>
+                  </a:schemeClr>
+                </a:solidFill>
+                <a:latin typeface="Roboto Light" panose="02000000000000000000" pitchFamily="2" charset="0"/>
+                <a:ea typeface="Roboto Light" panose="02000000000000000000" pitchFamily="2" charset="0"/>
+                <a:cs typeface="+mn-cs"/>
+              </a:defRPr>
+            </a:lvl1pPr>
+            <a:lvl2pPr marL="457200" indent="0" algn="l" defTabSz="914400" rtl="0" eaLnBrk="1" latinLnBrk="0" hangingPunct="1">
+              <a:lnSpc>
+                <a:spcPct val="90000"/>
+              </a:lnSpc>
+              <a:spcBef>
+                <a:spcPts val="500"/>
+              </a:spcBef>
+              <a:buFont typeface="Arial" panose="020B0604020202020204" pitchFamily="34" charset="0"/>
+              <a:buNone/>
+              <a:defRPr sz="2400" kern="1200">
+                <a:solidFill>
+                  <a:srgbClr val="949494"/>
+                </a:solidFill>
+                <a:latin typeface="Roboto Light" panose="02000000000000000000" pitchFamily="2" charset="0"/>
+                <a:ea typeface="Roboto Light" panose="02000000000000000000" pitchFamily="2" charset="0"/>
+                <a:cs typeface="+mn-cs"/>
+              </a:defRPr>
+            </a:lvl2pPr>
+            <a:lvl3pPr marL="914400" indent="0" algn="l" defTabSz="914400" rtl="0" eaLnBrk="1" latinLnBrk="0" hangingPunct="1">
+              <a:lnSpc>
+                <a:spcPct val="90000"/>
+              </a:lnSpc>
+              <a:spcBef>
+                <a:spcPts val="500"/>
+              </a:spcBef>
+              <a:buFont typeface="Arial" panose="020B0604020202020204" pitchFamily="34" charset="0"/>
+              <a:buNone/>
+              <a:defRPr sz="2000" kern="1200">
+                <a:solidFill>
+                  <a:srgbClr val="949494"/>
+                </a:solidFill>
+                <a:latin typeface="Roboto Light" panose="02000000000000000000" pitchFamily="2" charset="0"/>
+                <a:ea typeface="Roboto Light" panose="02000000000000000000" pitchFamily="2" charset="0"/>
+                <a:cs typeface="+mn-cs"/>
+              </a:defRPr>
+            </a:lvl3pPr>
+            <a:lvl4pPr marL="1371600" indent="0" algn="l" defTabSz="914400" rtl="0" eaLnBrk="1" latinLnBrk="0" hangingPunct="1">
+              <a:lnSpc>
+                <a:spcPct val="90000"/>
+              </a:lnSpc>
+              <a:spcBef>
+                <a:spcPts val="500"/>
+              </a:spcBef>
+              <a:buFont typeface="Arial" panose="020B0604020202020204" pitchFamily="34" charset="0"/>
+              <a:buNone/>
+              <a:defRPr sz="1800" kern="1200">
+                <a:solidFill>
+                  <a:srgbClr val="949494"/>
+                </a:solidFill>
+                <a:latin typeface="Roboto Light" panose="02000000000000000000" pitchFamily="2" charset="0"/>
+                <a:ea typeface="Roboto Light" panose="02000000000000000000" pitchFamily="2" charset="0"/>
+                <a:cs typeface="+mn-cs"/>
+              </a:defRPr>
+            </a:lvl4pPr>
+            <a:lvl5pPr marL="1828800" indent="0" algn="l" defTabSz="914400" rtl="0" eaLnBrk="1" latinLnBrk="0" hangingPunct="1">
+              <a:lnSpc>
+                <a:spcPct val="90000"/>
+              </a:lnSpc>
+              <a:spcBef>
+                <a:spcPts val="500"/>
+              </a:spcBef>
+              <a:buFont typeface="Arial" panose="020B0604020202020204" pitchFamily="34" charset="0"/>
+              <a:buNone/>
+              <a:defRPr sz="1800" kern="1200">
+                <a:solidFill>
+                  <a:srgbClr val="949494"/>
+                </a:solidFill>
+                <a:latin typeface="Roboto Light" panose="02000000000000000000" pitchFamily="2" charset="0"/>
+                <a:ea typeface="Roboto Light" panose="02000000000000000000" pitchFamily="2" charset="0"/>
+                <a:cs typeface="+mn-cs"/>
+              </a:defRPr>
+            </a:lvl5pPr>
+            <a:lvl6pPr marL="2514600" indent="-228600" algn="l" defTabSz="914400" rtl="0" eaLnBrk="1" latinLnBrk="0" hangingPunct="1">
+              <a:lnSpc>
+                <a:spcPct val="90000"/>
+              </a:lnSpc>
+              <a:spcBef>
+                <a:spcPts val="500"/>
+              </a:spcBef>
+              <a:buFont typeface="Arial" panose="020B0604020202020204" pitchFamily="34" charset="0"/>
+              <a:buChar char="•"/>
+              <a:defRPr sz="1800" kern="1200">
+                <a:solidFill>
+                  <a:schemeClr val="tx1"/>
+                </a:solidFill>
+                <a:latin typeface="+mn-lt"/>
+                <a:ea typeface="+mn-ea"/>
+                <a:cs typeface="+mn-cs"/>
+              </a:defRPr>
+            </a:lvl6pPr>
+            <a:lvl7pPr marL="2971800" indent="-228600" algn="l" defTabSz="914400" rtl="0" eaLnBrk="1" latinLnBrk="0" hangingPunct="1">
+              <a:lnSpc>
+                <a:spcPct val="90000"/>
+              </a:lnSpc>
+              <a:spcBef>
+                <a:spcPts val="500"/>
+              </a:spcBef>
+              <a:buFont typeface="Arial" panose="020B0604020202020204" pitchFamily="34" charset="0"/>
+              <a:buChar char="•"/>
+              <a:defRPr sz="1800" kern="1200">
+                <a:solidFill>
+                  <a:schemeClr val="tx1"/>
+                </a:solidFill>
+                <a:latin typeface="+mn-lt"/>
+                <a:ea typeface="+mn-ea"/>
+                <a:cs typeface="+mn-cs"/>
+              </a:defRPr>
+            </a:lvl7pPr>
+            <a:lvl8pPr marL="3429000" indent="-228600" algn="l" defTabSz="914400" rtl="0" eaLnBrk="1" latinLnBrk="0" hangingPunct="1">
+              <a:lnSpc>
+                <a:spcPct val="90000"/>
+              </a:lnSpc>
+              <a:spcBef>
+                <a:spcPts val="500"/>
+              </a:spcBef>
+              <a:buFont typeface="Arial" panose="020B0604020202020204" pitchFamily="34" charset="0"/>
+              <a:buChar char="•"/>
+              <a:defRPr sz="1800" kern="1200">
+                <a:solidFill>
+                  <a:schemeClr val="tx1"/>
+                </a:solidFill>
+                <a:latin typeface="+mn-lt"/>
+                <a:ea typeface="+mn-ea"/>
+                <a:cs typeface="+mn-cs"/>
+              </a:defRPr>
+            </a:lvl8pPr>
+            <a:lvl9pPr marL="3886200" indent="-228600" algn="l" defTabSz="914400" rtl="0" eaLnBrk="1" latinLnBrk="0" hangingPunct="1">
+              <a:lnSpc>
+                <a:spcPct val="90000"/>
+              </a:lnSpc>
+              <a:spcBef>
+                <a:spcPts val="500"/>
+              </a:spcBef>
+              <a:buFont typeface="Arial" panose="020B0604020202020204" pitchFamily="34" charset="0"/>
+              <a:buChar char="•"/>
+              <a:defRPr sz="1800" kern="1200">
+                <a:solidFill>
+                  <a:schemeClr val="tx1"/>
+                </a:solidFill>
+                <a:latin typeface="+mn-lt"/>
+                <a:ea typeface="+mn-ea"/>
+                <a:cs typeface="+mn-cs"/>
+              </a:defRPr>
+            </a:lvl9pPr>
+          </a:lstStyle>
+          <a:p>
+            <a:pPr algn="ctr"/>
+            <a:r>
+              <a:rPr lang="de-CH" dirty="0" err="1"/>
+              <a:t>Shiny</a:t>
+            </a:r>
+            <a:r>
+              <a:rPr lang="de-CH" dirty="0"/>
+              <a:t> App</a:t>
+            </a:r>
+          </a:p>
+        </p:txBody>
+      </p:sp>
+    </p:spTree>
+    <p:extLst>
+      <p:ext uri="{BB962C8B-B14F-4D97-AF65-F5344CB8AC3E}">
+        <p14:creationId xmlns:p14="http://schemas.microsoft.com/office/powerpoint/2010/main" val="657913182"/>
+      </p:ext>
+    </p:extLst>
+  </p:cSld>
+  <p:clrMapOvr>
+    <a:masterClrMapping/>
+  </p:clrMapOvr>
+</p:sld>
+</file>
+
+<file path=ppt/slides/slide3.xml><?xml version="1.0" encoding="utf-8"?>
+<p:sld xmlns:a="http://schemas.openxmlformats.org/drawingml/2006/main" xmlns:r="http://schemas.openxmlformats.org/officeDocument/2006/relationships" xmlns:p="http://schemas.openxmlformats.org/presentationml/2006/main">
+  <p:cSld>
+    <p:spTree>
+      <p:nvGrpSpPr>
+        <p:cNvPr id="1" name=""/>
+        <p:cNvGrpSpPr/>
+        <p:nvPr/>
+      </p:nvGrpSpPr>
+      <p:grpSpPr>
+        <a:xfrm>
+          <a:off x="0" y="0"/>
+          <a:ext cx="0" cy="0"/>
+          <a:chOff x="0" y="0"/>
+          <a:chExt cx="0" cy="0"/>
+        </a:xfrm>
+      </p:grpSpPr>
+      <p:sp>
+        <p:nvSpPr>
           <p:cNvPr id="2" name="Title 1"/>
           <p:cNvSpPr>
             <a:spLocks noGrp="1"/>
@@ -4077,7 +4769,7 @@
             <a:fld id="{71F18206-3CFE-43A4-B2DC-9A718AC19900}" type="slidenum">
               <a:rPr lang="en-US" smtClean="0"/>
               <a:pPr/>
-              <a:t>2</a:t>
+              <a:t>3</a:t>
             </a:fld>
             <a:endParaRPr lang="en-US"/>
           </a:p>
@@ -4096,7 +4788,7 @@
 </p:sld>
 </file>
 
-<file path=ppt/slides/slide3.xml><?xml version="1.0" encoding="utf-8"?>
+<file path=ppt/slides/slide4.xml><?xml version="1.0" encoding="utf-8"?>
 <p:sld xmlns:a="http://schemas.openxmlformats.org/drawingml/2006/main" xmlns:r="http://schemas.openxmlformats.org/officeDocument/2006/relationships" xmlns:p="http://schemas.openxmlformats.org/presentationml/2006/main">
   <p:cSld>
     <p:spTree>
@@ -4740,7 +5432,7 @@
             <a:fld id="{71F18206-3CFE-43A4-B2DC-9A718AC19900}" type="slidenum">
               <a:rPr lang="en-US" smtClean="0"/>
               <a:pPr/>
-              <a:t>3</a:t>
+              <a:t>4</a:t>
             </a:fld>
             <a:endParaRPr lang="en-US"/>
           </a:p>

</xml_diff>